<commit_message>
todo-list.php auf Module zerlegt, Presentation aktualisiert
</commit_message>
<xml_diff>
--- a/Presentation/Dynamische Webentwicklung.pptx
+++ b/Presentation/Dynamische Webentwicklung.pptx
@@ -5,7 +5,7 @@
     <p:sldMasterId id="2147483673" r:id="rId1"/>
   </p:sldMasterIdLst>
   <p:notesMasterIdLst>
-    <p:notesMasterId r:id="rId11"/>
+    <p:notesMasterId r:id="rId9"/>
   </p:notesMasterIdLst>
   <p:sldIdLst>
     <p:sldId id="256" r:id="rId2"/>
@@ -15,8 +15,6 @@
     <p:sldId id="264" r:id="rId6"/>
     <p:sldId id="257" r:id="rId7"/>
     <p:sldId id="261" r:id="rId8"/>
-    <p:sldId id="259" r:id="rId9"/>
-    <p:sldId id="260" r:id="rId10"/>
   </p:sldIdLst>
   <p:sldSz cx="12192000" cy="6858000"/>
   <p:notesSz cx="6858000" cy="9144000"/>
@@ -4322,6 +4320,58 @@
           <a:bodyPr/>
           <a:lstStyle/>
           <a:p>
+            <a:pPr marL="0" marR="0" lvl="0" indent="0" algn="l" defTabSz="914400" rtl="0" eaLnBrk="1" fontAlgn="auto" latinLnBrk="0" hangingPunct="1">
+              <a:lnSpc>
+                <a:spcPct val="100000"/>
+              </a:lnSpc>
+              <a:spcBef>
+                <a:spcPts val="0"/>
+              </a:spcBef>
+              <a:spcAft>
+                <a:spcPts val="0"/>
+              </a:spcAft>
+              <a:buClrTx/>
+              <a:buSzTx/>
+              <a:buFontTx/>
+              <a:buNone/>
+              <a:tabLst/>
+              <a:defRPr/>
+            </a:pPr>
+            <a:r>
+              <a:rPr lang="de-DE" sz="1200" dirty="0"/>
+              <a:t>für die Darstellung und Logik im Browser</a:t>
+            </a:r>
+            <a:endParaRPr lang="ru-RU" sz="1200" dirty="0"/>
+          </a:p>
+          <a:p>
+            <a:pPr marL="0" marR="0" lvl="0" indent="0" algn="l" defTabSz="914400" rtl="0" eaLnBrk="1" fontAlgn="auto" latinLnBrk="0" hangingPunct="1">
+              <a:lnSpc>
+                <a:spcPct val="100000"/>
+              </a:lnSpc>
+              <a:spcBef>
+                <a:spcPts val="0"/>
+              </a:spcBef>
+              <a:spcAft>
+                <a:spcPts val="0"/>
+              </a:spcAft>
+              <a:buClrTx/>
+              <a:buSzTx/>
+              <a:buFontTx/>
+              <a:buNone/>
+              <a:tabLst/>
+              <a:defRPr/>
+            </a:pPr>
+            <a:r>
+              <a:rPr lang="de-DE" sz="1200" dirty="0"/>
+              <a:t>HTML CSS JS sind </a:t>
+            </a:r>
+            <a:r>
+              <a:rPr lang="de-DE" sz="1200"/>
+              <a:t>keine Programmiersprachen</a:t>
+            </a:r>
+            <a:endParaRPr lang="de-DE" sz="1200" dirty="0"/>
+          </a:p>
+          <a:p>
             <a:endParaRPr lang="de-DE" dirty="0"/>
           </a:p>
         </p:txBody>
@@ -10090,8 +10140,8 @@
         </p:nvSpPr>
         <p:spPr>
           <a:xfrm>
-            <a:off x="6096000" y="1122363"/>
-            <a:ext cx="5775960" cy="3204134"/>
+            <a:off x="4267200" y="1122363"/>
+            <a:ext cx="7604760" cy="1666557"/>
           </a:xfrm>
         </p:spPr>
         <p:txBody>
@@ -10106,7 +10156,7 @@
                   <a:schemeClr val="bg1"/>
                 </a:solidFill>
               </a:rPr>
-              <a:t>Dynamische Webentwicklung</a:t>
+              <a:t>Webentwicklung</a:t>
             </a:r>
             <a:br>
               <a:rPr lang="de-DE" sz="4800" dirty="0">
@@ -10115,11 +10165,14 @@
                 </a:solidFill>
               </a:rPr>
             </a:br>
-            <a:endParaRPr lang="de-DE" sz="4800" dirty="0">
-              <a:solidFill>
-                <a:schemeClr val="bg1"/>
-              </a:solidFill>
-            </a:endParaRPr>
+            <a:r>
+              <a:rPr lang="de-DE" sz="4800" dirty="0">
+                <a:solidFill>
+                  <a:schemeClr val="bg1"/>
+                </a:solidFill>
+              </a:rPr>
+              <a:t>dynamisch VS statisch</a:t>
+            </a:r>
           </a:p>
         </p:txBody>
       </p:sp>
@@ -12131,8 +12184,9 @@
           <a:p>
             <a:r>
               <a:rPr lang="de-DE" sz="1800" dirty="0"/>
-              <a:t>HTML, CSS, JavaScript (für die Darstellung und Logik im Browser)</a:t>
-            </a:r>
+              <a:t>HTML, CSS, JavaScript </a:t>
+            </a:r>
+            <a:endParaRPr lang="ru-RU" sz="1800" dirty="0"/>
           </a:p>
           <a:p>
             <a:r>
@@ -14130,171 +14184,6 @@
       <p:bldP spid="10" grpId="0" animBg="1"/>
     </p:bldLst>
   </p:timing>
-</p:sld>
-</file>
-
-<file path=ppt/slides/slide8.xml><?xml version="1.0" encoding="utf-8"?>
-<p:sld xmlns:a="http://schemas.openxmlformats.org/drawingml/2006/main" xmlns:r="http://schemas.openxmlformats.org/officeDocument/2006/relationships" xmlns:p="http://schemas.openxmlformats.org/presentationml/2006/main">
-  <p:cSld>
-    <p:spTree>
-      <p:nvGrpSpPr>
-        <p:cNvPr id="1" name=""/>
-        <p:cNvGrpSpPr/>
-        <p:nvPr/>
-      </p:nvGrpSpPr>
-      <p:grpSpPr>
-        <a:xfrm>
-          <a:off x="0" y="0"/>
-          <a:ext cx="0" cy="0"/>
-          <a:chOff x="0" y="0"/>
-          <a:chExt cx="0" cy="0"/>
-        </a:xfrm>
-      </p:grpSpPr>
-      <p:sp>
-        <p:nvSpPr>
-          <p:cNvPr id="3" name="Inhaltsplatzhalter 2">
-            <a:extLst>
-              <a:ext uri="{FF2B5EF4-FFF2-40B4-BE49-F238E27FC236}">
-                <a16:creationId xmlns:a16="http://schemas.microsoft.com/office/drawing/2014/main" id="{A3DFD87A-F1B7-24CE-8F15-18CB97CC2C8F}"/>
-              </a:ext>
-            </a:extLst>
-          </p:cNvPr>
-          <p:cNvSpPr>
-            <a:spLocks noGrp="1"/>
-          </p:cNvSpPr>
-          <p:nvPr>
-            <p:ph idx="1"/>
-          </p:nvPr>
-        </p:nvSpPr>
-        <p:spPr/>
-        <p:txBody>
-          <a:bodyPr/>
-          <a:lstStyle/>
-          <a:p>
-            <a:endParaRPr lang="de-DE"/>
-          </a:p>
-        </p:txBody>
-      </p:sp>
-      <p:pic>
-        <p:nvPicPr>
-          <p:cNvPr id="5" name="Grafik 4">
-            <a:extLst>
-              <a:ext uri="{FF2B5EF4-FFF2-40B4-BE49-F238E27FC236}">
-                <a16:creationId xmlns:a16="http://schemas.microsoft.com/office/drawing/2014/main" id="{68840487-E519-0FA5-ED4A-A44B41F5CDBC}"/>
-              </a:ext>
-            </a:extLst>
-          </p:cNvPr>
-          <p:cNvPicPr>
-            <a:picLocks noChangeAspect="1"/>
-          </p:cNvPicPr>
-          <p:nvPr/>
-        </p:nvPicPr>
-        <p:blipFill>
-          <a:blip r:embed="rId2"/>
-          <a:stretch>
-            <a:fillRect/>
-          </a:stretch>
-        </p:blipFill>
-        <p:spPr>
-          <a:xfrm>
-            <a:off x="1115568" y="2550708"/>
-            <a:ext cx="10254996" cy="3694176"/>
-          </a:xfrm>
-          <a:prstGeom prst="rect">
-            <a:avLst/>
-          </a:prstGeom>
-        </p:spPr>
-      </p:pic>
-    </p:spTree>
-    <p:extLst>
-      <p:ext uri="{BB962C8B-B14F-4D97-AF65-F5344CB8AC3E}">
-        <p14:creationId xmlns:p14="http://schemas.microsoft.com/office/powerpoint/2010/main" val="3986141816"/>
-      </p:ext>
-    </p:extLst>
-  </p:cSld>
-  <p:clrMapOvr>
-    <a:masterClrMapping/>
-  </p:clrMapOvr>
-</p:sld>
-</file>
-
-<file path=ppt/slides/slide9.xml><?xml version="1.0" encoding="utf-8"?>
-<p:sld xmlns:a="http://schemas.openxmlformats.org/drawingml/2006/main" xmlns:r="http://schemas.openxmlformats.org/officeDocument/2006/relationships" xmlns:p="http://schemas.openxmlformats.org/presentationml/2006/main">
-  <p:cSld>
-    <p:spTree>
-      <p:nvGrpSpPr>
-        <p:cNvPr id="1" name=""/>
-        <p:cNvGrpSpPr/>
-        <p:nvPr/>
-      </p:nvGrpSpPr>
-      <p:grpSpPr>
-        <a:xfrm>
-          <a:off x="0" y="0"/>
-          <a:ext cx="0" cy="0"/>
-          <a:chOff x="0" y="0"/>
-          <a:chExt cx="0" cy="0"/>
-        </a:xfrm>
-      </p:grpSpPr>
-      <p:sp>
-        <p:nvSpPr>
-          <p:cNvPr id="2" name="Titel 1">
-            <a:extLst>
-              <a:ext uri="{FF2B5EF4-FFF2-40B4-BE49-F238E27FC236}">
-                <a16:creationId xmlns:a16="http://schemas.microsoft.com/office/drawing/2014/main" id="{5895A76D-FE75-B976-2841-1C71D31D74F3}"/>
-              </a:ext>
-            </a:extLst>
-          </p:cNvPr>
-          <p:cNvSpPr>
-            <a:spLocks noGrp="1"/>
-          </p:cNvSpPr>
-          <p:nvPr>
-            <p:ph type="title"/>
-          </p:nvPr>
-        </p:nvSpPr>
-        <p:spPr/>
-        <p:txBody>
-          <a:bodyPr/>
-          <a:lstStyle/>
-          <a:p>
-            <a:endParaRPr lang="de-DE"/>
-          </a:p>
-        </p:txBody>
-      </p:sp>
-      <p:sp>
-        <p:nvSpPr>
-          <p:cNvPr id="3" name="Inhaltsplatzhalter 2">
-            <a:extLst>
-              <a:ext uri="{FF2B5EF4-FFF2-40B4-BE49-F238E27FC236}">
-                <a16:creationId xmlns:a16="http://schemas.microsoft.com/office/drawing/2014/main" id="{BF13D614-9F7F-15DA-52CD-2F9751612EBC}"/>
-              </a:ext>
-            </a:extLst>
-          </p:cNvPr>
-          <p:cNvSpPr>
-            <a:spLocks noGrp="1"/>
-          </p:cNvSpPr>
-          <p:nvPr>
-            <p:ph idx="1"/>
-          </p:nvPr>
-        </p:nvSpPr>
-        <p:spPr/>
-        <p:txBody>
-          <a:bodyPr/>
-          <a:lstStyle/>
-          <a:p>
-            <a:endParaRPr lang="de-DE"/>
-          </a:p>
-        </p:txBody>
-      </p:sp>
-    </p:spTree>
-    <p:extLst>
-      <p:ext uri="{BB962C8B-B14F-4D97-AF65-F5344CB8AC3E}">
-        <p14:creationId xmlns:p14="http://schemas.microsoft.com/office/powerpoint/2010/main" val="1029451280"/>
-      </p:ext>
-    </p:extLst>
-  </p:cSld>
-  <p:clrMapOvr>
-    <a:masterClrMapping/>
-  </p:clrMapOvr>
 </p:sld>
 </file>
 

</xml_diff>